<commit_message>
Finishing in class presentation
</commit_message>
<xml_diff>
--- a/docs/powerpoint/Class - WI Digital Transformation.pptx
+++ b/docs/powerpoint/Class - WI Digital Transformation.pptx
@@ -5,10 +5,10 @@
     <p:sldMasterId id="2147483672" r:id="rId4"/>
   </p:sldMasterIdLst>
   <p:notesMasterIdLst>
-    <p:notesMasterId r:id="rId23"/>
+    <p:notesMasterId r:id="rId26"/>
   </p:notesMasterIdLst>
   <p:handoutMasterIdLst>
-    <p:handoutMasterId r:id="rId24"/>
+    <p:handoutMasterId r:id="rId27"/>
   </p:handoutMasterIdLst>
   <p:sldIdLst>
     <p:sldId id="256" r:id="rId5"/>
@@ -28,7 +28,10 @@
     <p:sldId id="274" r:id="rId19"/>
     <p:sldId id="275" r:id="rId20"/>
     <p:sldId id="276" r:id="rId21"/>
-    <p:sldId id="260" r:id="rId22"/>
+    <p:sldId id="277" r:id="rId22"/>
+    <p:sldId id="278" r:id="rId23"/>
+    <p:sldId id="260" r:id="rId24"/>
+    <p:sldId id="279" r:id="rId25"/>
   </p:sldIdLst>
   <p:sldSz cx="12192000" cy="6858000"/>
   <p:notesSz cx="6858000" cy="9144000"/>
@@ -936,7 +939,7 @@
           <a:p>
             <a:fld id="{C6B3AB32-59DF-41F1-9618-EDFBF5049629}" type="slidenum">
               <a:rPr lang="en-US" smtClean="0"/>
-              <a:t>18</a:t>
+              <a:t>20</a:t>
             </a:fld>
             <a:endParaRPr lang="en-US" dirty="0"/>
           </a:p>
@@ -1441,6 +1444,20 @@
               <a:rPr lang="en-US" dirty="0"/>
               <a:t>No business is in the business of not making more money</a:t>
             </a:r>
+          </a:p>
+          <a:p>
+            <a:endParaRPr lang="en-US" dirty="0"/>
+          </a:p>
+          <a:p>
+            <a:r>
+              <a:rPr lang="en-US" dirty="0"/>
+              <a:t>API -&gt; SQL Server -&gt; Kafka (UI &amp; Docker) -&gt; RavenDB -&gt; DW -&gt; </a:t>
+            </a:r>
+            <a:r>
+              <a:rPr lang="en-US" dirty="0" err="1"/>
+              <a:t>PowerBI</a:t>
+            </a:r>
+            <a:endParaRPr lang="en-US" dirty="0"/>
           </a:p>
         </p:txBody>
       </p:sp>
@@ -6168,7 +6185,34 @@
           <a:bodyPr/>
           <a:lstStyle/>
           <a:p>
-            <a:endParaRPr lang="en-US" dirty="0"/>
+            <a:r>
+              <a:rPr lang="en-US" dirty="0"/>
+              <a:t>Broadcast changes in data sources</a:t>
+            </a:r>
+          </a:p>
+          <a:p>
+            <a:r>
+              <a:rPr lang="en-US" dirty="0"/>
+              <a:t>Data warehouses update live with changes</a:t>
+            </a:r>
+          </a:p>
+          <a:p>
+            <a:r>
+              <a:rPr lang="en-US" dirty="0"/>
+              <a:t>Large queries happen in tools meant for analysis</a:t>
+            </a:r>
+          </a:p>
+          <a:p>
+            <a:r>
+              <a:rPr lang="en-US" dirty="0"/>
+              <a:t>Business intelligence is done is tools more apt for the job</a:t>
+            </a:r>
+          </a:p>
+          <a:p>
+            <a:r>
+              <a:rPr lang="en-US" dirty="0"/>
+              <a:t>Orchestrated by event brokers</a:t>
+            </a:r>
           </a:p>
         </p:txBody>
       </p:sp>
@@ -6342,7 +6386,28 @@
           <a:bodyPr/>
           <a:lstStyle/>
           <a:p>
-            <a:endParaRPr lang="en-US" dirty="0"/>
+            <a:r>
+              <a:rPr lang="en-US" dirty="0"/>
+              <a:t>One platform to rule them all</a:t>
+            </a:r>
+          </a:p>
+          <a:p>
+            <a:r>
+              <a:rPr lang="en-US" dirty="0"/>
+              <a:t>ETL vs ELT</a:t>
+            </a:r>
+          </a:p>
+          <a:p>
+            <a:r>
+              <a:rPr lang="en-US" dirty="0"/>
+              <a:t>Time travel</a:t>
+            </a:r>
+          </a:p>
+          <a:p>
+            <a:r>
+              <a:rPr lang="en-US" dirty="0"/>
+              <a:t>Snowpark (embedded python functions)</a:t>
+            </a:r>
           </a:p>
         </p:txBody>
       </p:sp>
@@ -6575,7 +6640,7 @@
                   <a:srgbClr val="FFFEFF"/>
                 </a:solidFill>
               </a:rPr>
-              <a:t>Research Evaluation: Part 1 of 6</a:t>
+              <a:t>Research Evaluation: Part 1 of 3</a:t>
             </a:r>
           </a:p>
         </p:txBody>
@@ -6599,16 +6664,33 @@
         <p:spPr>
           <a:xfrm>
             <a:off x="447817" y="874644"/>
-            <a:ext cx="11290860" cy="1494484"/>
+            <a:ext cx="11290860" cy="1982856"/>
           </a:xfrm>
         </p:spPr>
         <p:txBody>
-          <a:bodyPr anchor="t"/>
+          <a:bodyPr anchor="t">
+            <a:normAutofit/>
+          </a:bodyPr>
           <a:lstStyle/>
           <a:p>
-            <a:pPr marL="0" indent="0">
-              <a:buNone/>
-            </a:pPr>
+            <a:r>
+              <a:rPr lang="en-US" dirty="0">
+                <a:latin typeface="Aptos" panose="020B0004020202020204" pitchFamily="34" charset="0"/>
+                <a:cs typeface="Times New Roman" panose="02020603050405020304" pitchFamily="18" charset="0"/>
+              </a:rPr>
+              <a:t>Stuck using Elastic stack as it’s not overly integrate-able with other existing tooling</a:t>
+            </a:r>
+          </a:p>
+          <a:p>
+            <a:r>
+              <a:rPr lang="en-US" dirty="0">
+                <a:latin typeface="Aptos" panose="020B0004020202020204" pitchFamily="34" charset="0"/>
+                <a:cs typeface="Times New Roman" panose="02020603050405020304" pitchFamily="18" charset="0"/>
+              </a:rPr>
+              <a:t>Would only ever use about 10% of Snowflake’s capabilities</a:t>
+            </a:r>
+          </a:p>
+          <a:p>
             <a:r>
               <a:rPr lang="en-US" sz="1800" dirty="0">
                 <a:effectLst/>
@@ -6616,9 +6698,19 @@
                 <a:ea typeface="Aptos" panose="020B0004020202020204" pitchFamily="34" charset="0"/>
                 <a:cs typeface="Times New Roman" panose="02020603050405020304" pitchFamily="18" charset="0"/>
               </a:rPr>
-              <a:t>Solution 2 allows for the exploration and customization of an on-premises architecture tailored to Williams International’s unique requirements. This provides an opportunity to test and showcase the feasibility, scalability, and effectiveness of a bespoke solution, offering deeper insights into how it can be integrated into the organization’s existing systems and workflows.</a:t>
-            </a:r>
-            <a:endParaRPr lang="en-US" dirty="0"/>
+              <a:t>Custom On-Premises Data Platform</a:t>
+            </a:r>
+          </a:p>
+          <a:p>
+            <a:r>
+              <a:rPr lang="en-US" sz="1800" dirty="0">
+                <a:effectLst/>
+                <a:latin typeface="Aptos" panose="020B0004020202020204" pitchFamily="34" charset="0"/>
+                <a:ea typeface="Aptos" panose="020B0004020202020204" pitchFamily="34" charset="0"/>
+                <a:cs typeface="Times New Roman" panose="02020603050405020304" pitchFamily="18" charset="0"/>
+              </a:rPr>
+              <a:t>Exploration and customization of a specific data platform</a:t>
+            </a:r>
           </a:p>
         </p:txBody>
       </p:sp>
@@ -6821,7 +6913,7 @@
                   <a:srgbClr val="FFFEFF"/>
                 </a:solidFill>
               </a:rPr>
-              <a:t>Research Evaluation: Part 2 of 6</a:t>
+              <a:t>Research Evaluation: Part 2 of 3</a:t>
             </a:r>
           </a:p>
         </p:txBody>
@@ -6856,7 +6948,7 @@
         <p:spPr bwMode="auto">
           <a:xfrm>
             <a:off x="354434" y="874643"/>
-            <a:ext cx="11477625" cy="5086350"/>
+            <a:ext cx="11477625" cy="4528630"/>
           </a:xfrm>
           <a:prstGeom prst="rect">
             <a:avLst/>
@@ -6887,7 +6979,7 @@
 </file>
 
 <file path=ppt/slides/slide14.xml><?xml version="1.0" encoding="utf-8"?>
-<p:sld xmlns:a="http://schemas.openxmlformats.org/drawingml/2006/main" xmlns:r="http://schemas.openxmlformats.org/officeDocument/2006/relationships" xmlns:p="http://schemas.openxmlformats.org/presentationml/2006/main">
+<p:sld xmlns:a="http://schemas.openxmlformats.org/drawingml/2006/main" xmlns:r="http://schemas.openxmlformats.org/officeDocument/2006/relationships" xmlns:p="http://schemas.openxmlformats.org/presentationml/2006/main" show="0">
   <p:cSld>
     <p:bg>
       <p:bgPr>
@@ -7151,7 +7243,7 @@
 </file>
 
 <file path=ppt/slides/slide15.xml><?xml version="1.0" encoding="utf-8"?>
-<p:sld xmlns:a="http://schemas.openxmlformats.org/drawingml/2006/main" xmlns:r="http://schemas.openxmlformats.org/officeDocument/2006/relationships" xmlns:p="http://schemas.openxmlformats.org/presentationml/2006/main">
+<p:sld xmlns:a="http://schemas.openxmlformats.org/drawingml/2006/main" xmlns:r="http://schemas.openxmlformats.org/officeDocument/2006/relationships" xmlns:p="http://schemas.openxmlformats.org/presentationml/2006/main" show="0">
   <p:cSld>
     <p:bg>
       <p:bgPr>
@@ -7415,7 +7507,7 @@
 </file>
 
 <file path=ppt/slides/slide16.xml><?xml version="1.0" encoding="utf-8"?>
-<p:sld xmlns:a="http://schemas.openxmlformats.org/drawingml/2006/main" xmlns:r="http://schemas.openxmlformats.org/officeDocument/2006/relationships" xmlns:p="http://schemas.openxmlformats.org/presentationml/2006/main">
+<p:sld xmlns:a="http://schemas.openxmlformats.org/drawingml/2006/main" xmlns:r="http://schemas.openxmlformats.org/officeDocument/2006/relationships" xmlns:p="http://schemas.openxmlformats.org/presentationml/2006/main" show="0">
   <p:cSld>
     <p:bg>
       <p:bgPr>
@@ -7864,7 +7956,7 @@
                   <a:srgbClr val="FFFEFF"/>
                 </a:solidFill>
               </a:rPr>
-              <a:t>Research Evaluation: Part 6 of 6</a:t>
+              <a:t>Research Evaluation: Part 3 of 3</a:t>
             </a:r>
           </a:p>
         </p:txBody>
@@ -7883,6 +7975,401 @@
 </file>
 
 <file path=ppt/slides/slide18.xml><?xml version="1.0" encoding="utf-8"?>
+<p:sld xmlns:a="http://schemas.openxmlformats.org/drawingml/2006/main" xmlns:r="http://schemas.openxmlformats.org/officeDocument/2006/relationships" xmlns:p="http://schemas.openxmlformats.org/presentationml/2006/main">
+  <p:cSld>
+    <p:spTree>
+      <p:nvGrpSpPr>
+        <p:cNvPr id="1" name=""/>
+        <p:cNvGrpSpPr/>
+        <p:nvPr/>
+      </p:nvGrpSpPr>
+      <p:grpSpPr>
+        <a:xfrm>
+          <a:off x="0" y="0"/>
+          <a:ext cx="0" cy="0"/>
+          <a:chOff x="0" y="0"/>
+          <a:chExt cx="0" cy="0"/>
+        </a:xfrm>
+      </p:grpSpPr>
+      <p:sp>
+        <p:nvSpPr>
+          <p:cNvPr id="2" name="Title 1">
+            <a:extLst>
+              <a:ext uri="{FF2B5EF4-FFF2-40B4-BE49-F238E27FC236}">
+                <a16:creationId xmlns:a16="http://schemas.microsoft.com/office/drawing/2014/main" id="{9C7CCF18-215F-15BD-41B6-12385BDF54F5}"/>
+              </a:ext>
+            </a:extLst>
+          </p:cNvPr>
+          <p:cNvSpPr>
+            <a:spLocks noGrp="1"/>
+          </p:cNvSpPr>
+          <p:nvPr>
+            <p:ph type="title"/>
+          </p:nvPr>
+        </p:nvSpPr>
+        <p:spPr/>
+        <p:txBody>
+          <a:bodyPr/>
+          <a:lstStyle/>
+          <a:p>
+            <a:r>
+              <a:rPr lang="en-US" dirty="0"/>
+              <a:t>LESSONS Learned</a:t>
+            </a:r>
+          </a:p>
+        </p:txBody>
+      </p:sp>
+      <p:sp>
+        <p:nvSpPr>
+          <p:cNvPr id="3" name="Content Placeholder 2">
+            <a:extLst>
+              <a:ext uri="{FF2B5EF4-FFF2-40B4-BE49-F238E27FC236}">
+                <a16:creationId xmlns:a16="http://schemas.microsoft.com/office/drawing/2014/main" id="{C8BAF022-6F5A-26A5-6CA4-B1228312ACD8}"/>
+              </a:ext>
+            </a:extLst>
+          </p:cNvPr>
+          <p:cNvSpPr>
+            <a:spLocks noGrp="1"/>
+          </p:cNvSpPr>
+          <p:nvPr>
+            <p:ph sz="half" idx="1"/>
+          </p:nvPr>
+        </p:nvSpPr>
+        <p:spPr/>
+        <p:txBody>
+          <a:bodyPr/>
+          <a:lstStyle/>
+          <a:p>
+            <a:r>
+              <a:rPr lang="en-US" dirty="0"/>
+              <a:t>The Data Lake is a concept, not just the implementation of one new piece of technology</a:t>
+            </a:r>
+          </a:p>
+          <a:p>
+            <a:r>
+              <a:rPr lang="en-US" dirty="0"/>
+              <a:t>Buy-in comes from the top down</a:t>
+            </a:r>
+          </a:p>
+        </p:txBody>
+      </p:sp>
+      <p:sp>
+        <p:nvSpPr>
+          <p:cNvPr id="4" name="Content Placeholder 3">
+            <a:extLst>
+              <a:ext uri="{FF2B5EF4-FFF2-40B4-BE49-F238E27FC236}">
+                <a16:creationId xmlns:a16="http://schemas.microsoft.com/office/drawing/2014/main" id="{D88E5E3A-7EDA-0252-F0BE-262C52535D94}"/>
+              </a:ext>
+            </a:extLst>
+          </p:cNvPr>
+          <p:cNvSpPr>
+            <a:spLocks noGrp="1"/>
+          </p:cNvSpPr>
+          <p:nvPr>
+            <p:ph sz="half" idx="2"/>
+          </p:nvPr>
+        </p:nvSpPr>
+        <p:spPr/>
+        <p:txBody>
+          <a:bodyPr/>
+          <a:lstStyle/>
+          <a:p>
+            <a:r>
+              <a:rPr lang="en-US" dirty="0"/>
+              <a:t>This project is bigger than one person</a:t>
+            </a:r>
+          </a:p>
+          <a:p>
+            <a:r>
+              <a:rPr lang="en-US" dirty="0"/>
+              <a:t>Other companies are experiencing the same issues</a:t>
+            </a:r>
+          </a:p>
+        </p:txBody>
+      </p:sp>
+    </p:spTree>
+    <p:extLst>
+      <p:ext uri="{BB962C8B-B14F-4D97-AF65-F5344CB8AC3E}">
+        <p14:creationId xmlns:p14="http://schemas.microsoft.com/office/powerpoint/2010/main" val="197643111"/>
+      </p:ext>
+    </p:extLst>
+  </p:cSld>
+  <p:clrMapOvr>
+    <a:masterClrMapping/>
+  </p:clrMapOvr>
+</p:sld>
+</file>
+
+<file path=ppt/slides/slide19.xml><?xml version="1.0" encoding="utf-8"?>
+<p:sld xmlns:a="http://schemas.openxmlformats.org/drawingml/2006/main" xmlns:r="http://schemas.openxmlformats.org/officeDocument/2006/relationships" xmlns:p="http://schemas.openxmlformats.org/presentationml/2006/main">
+  <p:cSld>
+    <p:spTree>
+      <p:nvGrpSpPr>
+        <p:cNvPr id="1" name=""/>
+        <p:cNvGrpSpPr/>
+        <p:nvPr/>
+      </p:nvGrpSpPr>
+      <p:grpSpPr>
+        <a:xfrm>
+          <a:off x="0" y="0"/>
+          <a:ext cx="0" cy="0"/>
+          <a:chOff x="0" y="0"/>
+          <a:chExt cx="0" cy="0"/>
+        </a:xfrm>
+      </p:grpSpPr>
+      <p:sp>
+        <p:nvSpPr>
+          <p:cNvPr id="2" name="Title 1">
+            <a:extLst>
+              <a:ext uri="{FF2B5EF4-FFF2-40B4-BE49-F238E27FC236}">
+                <a16:creationId xmlns:a16="http://schemas.microsoft.com/office/drawing/2014/main" id="{9330C3E5-DF51-0D63-801A-C6E5D918AC02}"/>
+              </a:ext>
+            </a:extLst>
+          </p:cNvPr>
+          <p:cNvSpPr>
+            <a:spLocks noGrp="1"/>
+          </p:cNvSpPr>
+          <p:nvPr>
+            <p:ph type="title"/>
+          </p:nvPr>
+        </p:nvSpPr>
+        <p:spPr/>
+        <p:txBody>
+          <a:bodyPr/>
+          <a:lstStyle/>
+          <a:p>
+            <a:r>
+              <a:rPr lang="en-US" dirty="0"/>
+              <a:t>Future Work and Conclusion</a:t>
+            </a:r>
+          </a:p>
+        </p:txBody>
+      </p:sp>
+      <p:sp>
+        <p:nvSpPr>
+          <p:cNvPr id="3" name="Content Placeholder 2">
+            <a:extLst>
+              <a:ext uri="{FF2B5EF4-FFF2-40B4-BE49-F238E27FC236}">
+                <a16:creationId xmlns:a16="http://schemas.microsoft.com/office/drawing/2014/main" id="{F9F9173E-F2BD-9037-10C6-DE301646C1AD}"/>
+              </a:ext>
+            </a:extLst>
+          </p:cNvPr>
+          <p:cNvSpPr>
+            <a:spLocks noGrp="1"/>
+          </p:cNvSpPr>
+          <p:nvPr>
+            <p:ph idx="1"/>
+          </p:nvPr>
+        </p:nvSpPr>
+        <p:spPr/>
+        <p:txBody>
+          <a:bodyPr anchor="t"/>
+          <a:lstStyle/>
+          <a:p>
+            <a:r>
+              <a:rPr lang="en-US" dirty="0"/>
+              <a:t>Limitations</a:t>
+            </a:r>
+          </a:p>
+          <a:p>
+            <a:pPr lvl="1"/>
+            <a:r>
+              <a:rPr lang="en-US" dirty="0"/>
+              <a:t>Lack of knowledge</a:t>
+            </a:r>
+          </a:p>
+          <a:p>
+            <a:pPr lvl="1"/>
+            <a:r>
+              <a:rPr lang="en-US" dirty="0"/>
+              <a:t>Technology is rapidly changing</a:t>
+            </a:r>
+          </a:p>
+          <a:p>
+            <a:pPr lvl="1"/>
+            <a:r>
+              <a:rPr lang="en-US" dirty="0"/>
+              <a:t>Time</a:t>
+            </a:r>
+          </a:p>
+          <a:p>
+            <a:pPr lvl="1"/>
+            <a:r>
+              <a:rPr lang="en-US" dirty="0"/>
+              <a:t>Money</a:t>
+            </a:r>
+          </a:p>
+          <a:p>
+            <a:r>
+              <a:rPr lang="en-US" dirty="0"/>
+              <a:t>Future Work</a:t>
+            </a:r>
+          </a:p>
+          <a:p>
+            <a:pPr lvl="1"/>
+            <a:r>
+              <a:rPr lang="en-US" dirty="0"/>
+              <a:t>Implement broadcasting changes pattern for live data replication</a:t>
+            </a:r>
+          </a:p>
+          <a:p>
+            <a:pPr lvl="1"/>
+            <a:r>
+              <a:rPr lang="en-US" dirty="0"/>
+              <a:t>Reconsider ITAR and Cloud native platforms</a:t>
+            </a:r>
+          </a:p>
+          <a:p>
+            <a:pPr lvl="1"/>
+            <a:r>
+              <a:rPr lang="en-US" dirty="0"/>
+              <a:t>Assemble dedicated data engineering team</a:t>
+            </a:r>
+          </a:p>
+        </p:txBody>
+      </p:sp>
+    </p:spTree>
+    <p:extLst>
+      <p:ext uri="{BB962C8B-B14F-4D97-AF65-F5344CB8AC3E}">
+        <p14:creationId xmlns:p14="http://schemas.microsoft.com/office/powerpoint/2010/main" val="319721961"/>
+      </p:ext>
+    </p:extLst>
+  </p:cSld>
+  <p:clrMapOvr>
+    <a:masterClrMapping/>
+  </p:clrMapOvr>
+</p:sld>
+</file>
+
+<file path=ppt/slides/slide2.xml><?xml version="1.0" encoding="utf-8"?>
+<p:sld xmlns:a="http://schemas.openxmlformats.org/drawingml/2006/main" xmlns:r="http://schemas.openxmlformats.org/officeDocument/2006/relationships" xmlns:p="http://schemas.openxmlformats.org/presentationml/2006/main">
+  <p:cSld>
+    <p:spTree>
+      <p:nvGrpSpPr>
+        <p:cNvPr id="1" name=""/>
+        <p:cNvGrpSpPr/>
+        <p:nvPr/>
+      </p:nvGrpSpPr>
+      <p:grpSpPr>
+        <a:xfrm>
+          <a:off x="0" y="0"/>
+          <a:ext cx="0" cy="0"/>
+          <a:chOff x="0" y="0"/>
+          <a:chExt cx="0" cy="0"/>
+        </a:xfrm>
+      </p:grpSpPr>
+      <p:sp>
+        <p:nvSpPr>
+          <p:cNvPr id="2" name="Title 1">
+            <a:extLst>
+              <a:ext uri="{FF2B5EF4-FFF2-40B4-BE49-F238E27FC236}">
+                <a16:creationId xmlns:a16="http://schemas.microsoft.com/office/drawing/2014/main" id="{CA9A793C-7597-5D7E-EA2C-656BAC422D15}"/>
+              </a:ext>
+            </a:extLst>
+          </p:cNvPr>
+          <p:cNvSpPr>
+            <a:spLocks noGrp="1"/>
+          </p:cNvSpPr>
+          <p:nvPr>
+            <p:ph type="title"/>
+          </p:nvPr>
+        </p:nvSpPr>
+        <p:spPr/>
+        <p:txBody>
+          <a:bodyPr/>
+          <a:lstStyle/>
+          <a:p>
+            <a:r>
+              <a:rPr lang="en-US" dirty="0"/>
+              <a:t>Agenda</a:t>
+            </a:r>
+          </a:p>
+        </p:txBody>
+      </p:sp>
+      <p:sp>
+        <p:nvSpPr>
+          <p:cNvPr id="3" name="Content Placeholder 2">
+            <a:extLst>
+              <a:ext uri="{FF2B5EF4-FFF2-40B4-BE49-F238E27FC236}">
+                <a16:creationId xmlns:a16="http://schemas.microsoft.com/office/drawing/2014/main" id="{37CC7B11-3D67-5988-5B70-0BC0D8E470F7}"/>
+              </a:ext>
+            </a:extLst>
+          </p:cNvPr>
+          <p:cNvSpPr>
+            <a:spLocks noGrp="1"/>
+          </p:cNvSpPr>
+          <p:nvPr>
+            <p:ph sz="half" idx="1"/>
+          </p:nvPr>
+        </p:nvSpPr>
+        <p:spPr/>
+        <p:txBody>
+          <a:bodyPr anchor="t"/>
+          <a:lstStyle/>
+          <a:p>
+            <a:r>
+              <a:rPr lang="en-US" dirty="0"/>
+              <a:t>Organization/Industry Description</a:t>
+            </a:r>
+          </a:p>
+          <a:p>
+            <a:r>
+              <a:rPr lang="en-US" dirty="0"/>
+              <a:t>Current State of Resources</a:t>
+            </a:r>
+          </a:p>
+          <a:p>
+            <a:r>
+              <a:rPr lang="en-US" dirty="0"/>
+              <a:t>Problem Description/Research Question</a:t>
+            </a:r>
+          </a:p>
+          <a:p>
+            <a:r>
+              <a:rPr lang="en-US" dirty="0"/>
+              <a:t>Method</a:t>
+            </a:r>
+          </a:p>
+          <a:p>
+            <a:r>
+              <a:rPr lang="en-US" dirty="0"/>
+              <a:t>Deliverables/Findings</a:t>
+            </a:r>
+          </a:p>
+          <a:p>
+            <a:r>
+              <a:rPr lang="en-US" dirty="0"/>
+              <a:t>Research Evaluation</a:t>
+            </a:r>
+          </a:p>
+          <a:p>
+            <a:r>
+              <a:rPr lang="en-US" dirty="0"/>
+              <a:t>Lessons Learned</a:t>
+            </a:r>
+          </a:p>
+          <a:p>
+            <a:r>
+              <a:rPr lang="en-US" dirty="0"/>
+              <a:t>Future Work and Conclusion </a:t>
+            </a:r>
+          </a:p>
+        </p:txBody>
+      </p:sp>
+    </p:spTree>
+    <p:extLst>
+      <p:ext uri="{BB962C8B-B14F-4D97-AF65-F5344CB8AC3E}">
+        <p14:creationId xmlns:p14="http://schemas.microsoft.com/office/powerpoint/2010/main" val="2110834798"/>
+      </p:ext>
+    </p:extLst>
+  </p:cSld>
+  <p:clrMapOvr>
+    <a:masterClrMapping/>
+  </p:clrMapOvr>
+</p:sld>
+</file>
+
+<file path=ppt/slides/slide20.xml><?xml version="1.0" encoding="utf-8"?>
 <p:sld xmlns:a="http://schemas.openxmlformats.org/drawingml/2006/main" xmlns:r="http://schemas.openxmlformats.org/officeDocument/2006/relationships" xmlns:p="http://schemas.openxmlformats.org/presentationml/2006/main">
   <p:cSld>
     <p:bg>
@@ -8377,7 +8864,7 @@
 </p:sld>
 </file>
 
-<file path=ppt/slides/slide2.xml><?xml version="1.0" encoding="utf-8"?>
+<file path=ppt/slides/slide21.xml><?xml version="1.0" encoding="utf-8"?>
 <p:sld xmlns:a="http://schemas.openxmlformats.org/drawingml/2006/main" xmlns:r="http://schemas.openxmlformats.org/officeDocument/2006/relationships" xmlns:p="http://schemas.openxmlformats.org/presentationml/2006/main">
   <p:cSld>
     <p:spTree>
@@ -8399,7 +8886,7 @@
           <p:cNvPr id="2" name="Title 1">
             <a:extLst>
               <a:ext uri="{FF2B5EF4-FFF2-40B4-BE49-F238E27FC236}">
-                <a16:creationId xmlns:a16="http://schemas.microsoft.com/office/drawing/2014/main" id="{CA9A793C-7597-5D7E-EA2C-656BAC422D15}"/>
+                <a16:creationId xmlns:a16="http://schemas.microsoft.com/office/drawing/2014/main" id="{B3665770-2368-3DFB-DB2E-9E474186470C}"/>
               </a:ext>
             </a:extLst>
           </p:cNvPr>
@@ -8417,7 +8904,7 @@
           <a:p>
             <a:r>
               <a:rPr lang="en-US" dirty="0"/>
-              <a:t>Agenda</a:t>
+              <a:t>References</a:t>
             </a:r>
           </a:p>
         </p:txBody>
@@ -8427,7 +8914,7 @@
           <p:cNvPr id="3" name="Content Placeholder 2">
             <a:extLst>
               <a:ext uri="{FF2B5EF4-FFF2-40B4-BE49-F238E27FC236}">
-                <a16:creationId xmlns:a16="http://schemas.microsoft.com/office/drawing/2014/main" id="{37CC7B11-3D67-5988-5B70-0BC0D8E470F7}"/>
+                <a16:creationId xmlns:a16="http://schemas.microsoft.com/office/drawing/2014/main" id="{378087DC-74F8-C24B-1B8E-BE20D1EF1168}"/>
               </a:ext>
             </a:extLst>
           </p:cNvPr>
@@ -8435,67 +8922,606 @@
             <a:spLocks noGrp="1"/>
           </p:cNvSpPr>
           <p:nvPr>
-            <p:ph sz="half" idx="1"/>
+            <p:ph idx="1"/>
           </p:nvPr>
         </p:nvSpPr>
         <p:spPr/>
         <p:txBody>
-          <a:bodyPr anchor="t"/>
+          <a:bodyPr anchor="t">
+            <a:normAutofit fontScale="62500" lnSpcReduction="20000"/>
+          </a:bodyPr>
           <a:lstStyle/>
           <a:p>
-            <a:r>
-              <a:rPr lang="en-US" dirty="0"/>
-              <a:t>Organization/Industry Description</a:t>
-            </a:r>
-          </a:p>
-          <a:p>
-            <a:r>
-              <a:rPr lang="en-US" dirty="0"/>
-              <a:t>Current State of Resources</a:t>
-            </a:r>
-          </a:p>
-          <a:p>
-            <a:r>
-              <a:rPr lang="en-US" dirty="0"/>
-              <a:t>Problem Description/Research Question</a:t>
-            </a:r>
-          </a:p>
-          <a:p>
-            <a:r>
-              <a:rPr lang="en-US" dirty="0"/>
-              <a:t>Method</a:t>
-            </a:r>
-          </a:p>
-          <a:p>
-            <a:r>
-              <a:rPr lang="en-US" dirty="0"/>
-              <a:t>Deliverables/Findings</a:t>
-            </a:r>
-          </a:p>
-          <a:p>
-            <a:r>
-              <a:rPr lang="en-US" dirty="0"/>
-              <a:t>Research Evaluation</a:t>
-            </a:r>
-          </a:p>
-          <a:p>
-            <a:r>
-              <a:rPr lang="en-US" dirty="0"/>
-              <a:t>Lessons Learned</a:t>
-            </a:r>
-          </a:p>
-          <a:p>
-            <a:r>
-              <a:rPr lang="en-US" dirty="0"/>
-              <a:t>Future Work and Conclusion </a:t>
-            </a:r>
+            <a:pPr marL="0" marR="0" indent="-914400">
+              <a:lnSpc>
+                <a:spcPct val="107000"/>
+              </a:lnSpc>
+              <a:spcAft>
+                <a:spcPts val="800"/>
+              </a:spcAft>
+              <a:buNone/>
+            </a:pPr>
+            <a:r>
+              <a:rPr lang="en-US" sz="1800" kern="100" dirty="0">
+                <a:effectLst/>
+                <a:latin typeface="Aptos" panose="020B0004020202020204" pitchFamily="34" charset="0"/>
+                <a:ea typeface="Aptos" panose="020B0004020202020204" pitchFamily="34" charset="0"/>
+                <a:cs typeface="Times New Roman" panose="02020603050405020304" pitchFamily="18" charset="0"/>
+              </a:rPr>
+              <a:t>Pratt &amp; Whitney. (n.d.). </a:t>
+            </a:r>
+            <a:r>
+              <a:rPr lang="en-US" sz="1800" i="1" kern="100" dirty="0">
+                <a:effectLst/>
+                <a:latin typeface="Aptos" panose="020B0004020202020204" pitchFamily="34" charset="0"/>
+                <a:ea typeface="Aptos" panose="020B0004020202020204" pitchFamily="34" charset="0"/>
+                <a:cs typeface="Times New Roman" panose="02020603050405020304" pitchFamily="18" charset="0"/>
+              </a:rPr>
+              <a:t>About Pratt &amp; Whitney</a:t>
+            </a:r>
+            <a:r>
+              <a:rPr lang="en-US" sz="1800" kern="100" dirty="0">
+                <a:effectLst/>
+                <a:latin typeface="Aptos" panose="020B0004020202020204" pitchFamily="34" charset="0"/>
+                <a:ea typeface="Aptos" panose="020B0004020202020204" pitchFamily="34" charset="0"/>
+                <a:cs typeface="Times New Roman" panose="02020603050405020304" pitchFamily="18" charset="0"/>
+              </a:rPr>
+              <a:t>. Retrieved November 16, 2024, from </a:t>
+            </a:r>
+            <a:r>
+              <a:rPr lang="en-US" sz="1800" u="sng" kern="100" dirty="0">
+                <a:solidFill>
+                  <a:srgbClr val="467886"/>
+                </a:solidFill>
+                <a:effectLst/>
+                <a:latin typeface="Aptos" panose="020B0004020202020204" pitchFamily="34" charset="0"/>
+                <a:ea typeface="Aptos" panose="020B0004020202020204" pitchFamily="34" charset="0"/>
+                <a:cs typeface="Times New Roman" panose="02020603050405020304" pitchFamily="18" charset="0"/>
+                <a:hlinkClick r:id="rId2"/>
+              </a:rPr>
+              <a:t>https://www.prattwhitney.com/en/our-company/about</a:t>
+            </a:r>
+            <a:endParaRPr lang="en-US" sz="1800" kern="100" dirty="0">
+              <a:effectLst/>
+              <a:latin typeface="Aptos" panose="020B0004020202020204" pitchFamily="34" charset="0"/>
+              <a:ea typeface="Aptos" panose="020B0004020202020204" pitchFamily="34" charset="0"/>
+              <a:cs typeface="Times New Roman" panose="02020603050405020304" pitchFamily="18" charset="0"/>
+            </a:endParaRPr>
+          </a:p>
+          <a:p>
+            <a:pPr marL="0" marR="0" indent="-914400">
+              <a:lnSpc>
+                <a:spcPct val="107000"/>
+              </a:lnSpc>
+              <a:spcAft>
+                <a:spcPts val="800"/>
+              </a:spcAft>
+              <a:buNone/>
+            </a:pPr>
+            <a:r>
+              <a:rPr lang="en-US" sz="1800" kern="100" dirty="0">
+                <a:effectLst/>
+                <a:latin typeface="Aptos" panose="020B0004020202020204" pitchFamily="34" charset="0"/>
+                <a:ea typeface="Aptos" panose="020B0004020202020204" pitchFamily="34" charset="0"/>
+                <a:cs typeface="Times New Roman" panose="02020603050405020304" pitchFamily="18" charset="0"/>
+              </a:rPr>
+              <a:t>Rolls-Royce Careers. (n.d.). </a:t>
+            </a:r>
+            <a:r>
+              <a:rPr lang="en-US" sz="1800" i="1" kern="100" dirty="0">
+                <a:effectLst/>
+                <a:latin typeface="Aptos" panose="020B0004020202020204" pitchFamily="34" charset="0"/>
+                <a:ea typeface="Aptos" panose="020B0004020202020204" pitchFamily="34" charset="0"/>
+                <a:cs typeface="Times New Roman" panose="02020603050405020304" pitchFamily="18" charset="0"/>
+              </a:rPr>
+              <a:t>Our Locations</a:t>
+            </a:r>
+            <a:r>
+              <a:rPr lang="en-US" sz="1800" kern="100" dirty="0">
+                <a:effectLst/>
+                <a:latin typeface="Aptos" panose="020B0004020202020204" pitchFamily="34" charset="0"/>
+                <a:ea typeface="Aptos" panose="020B0004020202020204" pitchFamily="34" charset="0"/>
+                <a:cs typeface="Times New Roman" panose="02020603050405020304" pitchFamily="18" charset="0"/>
+              </a:rPr>
+              <a:t>. Retrieved November 16, 2024, from </a:t>
+            </a:r>
+            <a:r>
+              <a:rPr lang="en-US" sz="1800" u="sng" kern="100" dirty="0">
+                <a:solidFill>
+                  <a:srgbClr val="467886"/>
+                </a:solidFill>
+                <a:effectLst/>
+                <a:latin typeface="Aptos" panose="020B0004020202020204" pitchFamily="34" charset="0"/>
+                <a:ea typeface="Aptos" panose="020B0004020202020204" pitchFamily="34" charset="0"/>
+                <a:cs typeface="Times New Roman" panose="02020603050405020304" pitchFamily="18" charset="0"/>
+                <a:hlinkClick r:id="rId3"/>
+              </a:rPr>
+              <a:t>https://careers.rolls-royce.com/usa/our-locations/rest-of-the-world/</a:t>
+            </a:r>
+            <a:endParaRPr lang="en-US" sz="1800" kern="100" dirty="0">
+              <a:effectLst/>
+              <a:latin typeface="Aptos" panose="020B0004020202020204" pitchFamily="34" charset="0"/>
+              <a:ea typeface="Aptos" panose="020B0004020202020204" pitchFamily="34" charset="0"/>
+              <a:cs typeface="Times New Roman" panose="02020603050405020304" pitchFamily="18" charset="0"/>
+            </a:endParaRPr>
+          </a:p>
+          <a:p>
+            <a:pPr marL="0" marR="0" indent="-914400">
+              <a:lnSpc>
+                <a:spcPct val="107000"/>
+              </a:lnSpc>
+              <a:spcAft>
+                <a:spcPts val="800"/>
+              </a:spcAft>
+              <a:buNone/>
+            </a:pPr>
+            <a:r>
+              <a:rPr lang="en-US" sz="1800" kern="100" dirty="0">
+                <a:effectLst/>
+                <a:latin typeface="Aptos" panose="020B0004020202020204" pitchFamily="34" charset="0"/>
+                <a:ea typeface="Aptos" panose="020B0004020202020204" pitchFamily="34" charset="0"/>
+                <a:cs typeface="Times New Roman" panose="02020603050405020304" pitchFamily="18" charset="0"/>
+              </a:rPr>
+              <a:t>GE Aerospace. (2024). </a:t>
+            </a:r>
+            <a:r>
+              <a:rPr lang="en-US" sz="1800" i="1" kern="100" dirty="0">
+                <a:effectLst/>
+                <a:latin typeface="Aptos" panose="020B0004020202020204" pitchFamily="34" charset="0"/>
+                <a:ea typeface="Aptos" panose="020B0004020202020204" pitchFamily="34" charset="0"/>
+                <a:cs typeface="Times New Roman" panose="02020603050405020304" pitchFamily="18" charset="0"/>
+              </a:rPr>
+              <a:t>GE Aerospace to hire more than 900 engineers this year</a:t>
+            </a:r>
+            <a:r>
+              <a:rPr lang="en-US" sz="1800" kern="100" dirty="0">
+                <a:effectLst/>
+                <a:latin typeface="Aptos" panose="020B0004020202020204" pitchFamily="34" charset="0"/>
+                <a:ea typeface="Aptos" panose="020B0004020202020204" pitchFamily="34" charset="0"/>
+                <a:cs typeface="Times New Roman" panose="02020603050405020304" pitchFamily="18" charset="0"/>
+              </a:rPr>
+              <a:t>. Retrieved November 16, 2024, from </a:t>
+            </a:r>
+            <a:r>
+              <a:rPr lang="en-US" sz="1800" u="sng" kern="100" dirty="0">
+                <a:solidFill>
+                  <a:srgbClr val="467886"/>
+                </a:solidFill>
+                <a:effectLst/>
+                <a:latin typeface="Aptos" panose="020B0004020202020204" pitchFamily="34" charset="0"/>
+                <a:ea typeface="Aptos" panose="020B0004020202020204" pitchFamily="34" charset="0"/>
+                <a:cs typeface="Times New Roman" panose="02020603050405020304" pitchFamily="18" charset="0"/>
+                <a:hlinkClick r:id="rId4"/>
+              </a:rPr>
+              <a:t>https://www.geaerospace.com/news/press-releases/ge-aerospace-hire-more-900-engineers-year</a:t>
+            </a:r>
+            <a:endParaRPr lang="en-US" sz="1800" kern="100" dirty="0">
+              <a:effectLst/>
+              <a:latin typeface="Aptos" panose="020B0004020202020204" pitchFamily="34" charset="0"/>
+              <a:ea typeface="Aptos" panose="020B0004020202020204" pitchFamily="34" charset="0"/>
+              <a:cs typeface="Times New Roman" panose="02020603050405020304" pitchFamily="18" charset="0"/>
+            </a:endParaRPr>
+          </a:p>
+          <a:p>
+            <a:pPr marL="0" marR="0" indent="-914400">
+              <a:lnSpc>
+                <a:spcPct val="107000"/>
+              </a:lnSpc>
+              <a:spcAft>
+                <a:spcPts val="800"/>
+              </a:spcAft>
+              <a:buNone/>
+            </a:pPr>
+            <a:r>
+              <a:rPr lang="en-US" sz="1800" kern="100" dirty="0">
+                <a:effectLst/>
+                <a:latin typeface="Aptos" panose="020B0004020202020204" pitchFamily="34" charset="0"/>
+                <a:ea typeface="Aptos" panose="020B0004020202020204" pitchFamily="34" charset="0"/>
+                <a:cs typeface="Times New Roman" panose="02020603050405020304" pitchFamily="18" charset="0"/>
+              </a:rPr>
+              <a:t>GE Aerospace. (2024). </a:t>
+            </a:r>
+            <a:r>
+              <a:rPr lang="en-US" sz="1800" i="1" kern="100" dirty="0">
+                <a:effectLst/>
+                <a:latin typeface="Aptos" panose="020B0004020202020204" pitchFamily="34" charset="0"/>
+                <a:ea typeface="Aptos" panose="020B0004020202020204" pitchFamily="34" charset="0"/>
+                <a:cs typeface="Times New Roman" panose="02020603050405020304" pitchFamily="18" charset="0"/>
+              </a:rPr>
+              <a:t>GE releases its 4Q23 full-year 2023 results and 2024 guidance</a:t>
+            </a:r>
+            <a:r>
+              <a:rPr lang="en-US" sz="1800" kern="100" dirty="0">
+                <a:effectLst/>
+                <a:latin typeface="Aptos" panose="020B0004020202020204" pitchFamily="34" charset="0"/>
+                <a:ea typeface="Aptos" panose="020B0004020202020204" pitchFamily="34" charset="0"/>
+                <a:cs typeface="Times New Roman" panose="02020603050405020304" pitchFamily="18" charset="0"/>
+              </a:rPr>
+              <a:t>. Retrieved November 16, 2024, from 	</a:t>
+            </a:r>
+            <a:r>
+              <a:rPr lang="en-US" sz="1800" u="sng" kern="100" dirty="0">
+                <a:solidFill>
+                  <a:srgbClr val="467886"/>
+                </a:solidFill>
+                <a:effectLst/>
+                <a:latin typeface="Aptos" panose="020B0004020202020204" pitchFamily="34" charset="0"/>
+                <a:ea typeface="Aptos" panose="020B0004020202020204" pitchFamily="34" charset="0"/>
+                <a:cs typeface="Times New Roman" panose="02020603050405020304" pitchFamily="18" charset="0"/>
+                <a:hlinkClick r:id="rId5"/>
+              </a:rPr>
+              <a:t>https://www.geaerospace.com/news/articles/performance/ge-releases-its-4q23-full-year-2023-results-and-2024-guidance</a:t>
+            </a:r>
+            <a:endParaRPr lang="en-US" sz="1800" kern="100" dirty="0">
+              <a:effectLst/>
+              <a:latin typeface="Aptos" panose="020B0004020202020204" pitchFamily="34" charset="0"/>
+              <a:ea typeface="Aptos" panose="020B0004020202020204" pitchFamily="34" charset="0"/>
+              <a:cs typeface="Times New Roman" panose="02020603050405020304" pitchFamily="18" charset="0"/>
+            </a:endParaRPr>
+          </a:p>
+          <a:p>
+            <a:pPr marL="0" marR="0" indent="-914400">
+              <a:lnSpc>
+                <a:spcPct val="107000"/>
+              </a:lnSpc>
+              <a:spcAft>
+                <a:spcPts val="800"/>
+              </a:spcAft>
+              <a:buNone/>
+            </a:pPr>
+            <a:r>
+              <a:rPr lang="en-US" sz="1800" kern="100" dirty="0">
+                <a:effectLst/>
+                <a:latin typeface="Aptos" panose="020B0004020202020204" pitchFamily="34" charset="0"/>
+                <a:ea typeface="Aptos" panose="020B0004020202020204" pitchFamily="34" charset="0"/>
+                <a:cs typeface="Times New Roman" panose="02020603050405020304" pitchFamily="18" charset="0"/>
+              </a:rPr>
+              <a:t>Amazon Web Services. (n.d.). </a:t>
+            </a:r>
+            <a:r>
+              <a:rPr lang="en-US" sz="1800" i="1" kern="100" dirty="0">
+                <a:effectLst/>
+                <a:latin typeface="Aptos" panose="020B0004020202020204" pitchFamily="34" charset="0"/>
+                <a:ea typeface="Aptos" panose="020B0004020202020204" pitchFamily="34" charset="0"/>
+                <a:cs typeface="Times New Roman" panose="02020603050405020304" pitchFamily="18" charset="0"/>
+              </a:rPr>
+              <a:t>What is a data lake?</a:t>
+            </a:r>
+            <a:r>
+              <a:rPr lang="en-US" sz="1800" kern="100" dirty="0">
+                <a:effectLst/>
+                <a:latin typeface="Aptos" panose="020B0004020202020204" pitchFamily="34" charset="0"/>
+                <a:ea typeface="Aptos" panose="020B0004020202020204" pitchFamily="34" charset="0"/>
+                <a:cs typeface="Times New Roman" panose="02020603050405020304" pitchFamily="18" charset="0"/>
+              </a:rPr>
+              <a:t> Retrieved November 17, 2024, from </a:t>
+            </a:r>
+            <a:r>
+              <a:rPr lang="en-US" sz="1800" u="sng" kern="100" dirty="0">
+                <a:solidFill>
+                  <a:srgbClr val="467886"/>
+                </a:solidFill>
+                <a:effectLst/>
+                <a:latin typeface="Aptos" panose="020B0004020202020204" pitchFamily="34" charset="0"/>
+                <a:ea typeface="Aptos" panose="020B0004020202020204" pitchFamily="34" charset="0"/>
+                <a:cs typeface="Times New Roman" panose="02020603050405020304" pitchFamily="18" charset="0"/>
+                <a:hlinkClick r:id="rId6"/>
+              </a:rPr>
+              <a:t>https://aws.amazon.com/what-is/data-lake/</a:t>
+            </a:r>
+            <a:endParaRPr lang="en-US" sz="1800" kern="100" dirty="0">
+              <a:effectLst/>
+              <a:latin typeface="Aptos" panose="020B0004020202020204" pitchFamily="34" charset="0"/>
+              <a:ea typeface="Aptos" panose="020B0004020202020204" pitchFamily="34" charset="0"/>
+              <a:cs typeface="Times New Roman" panose="02020603050405020304" pitchFamily="18" charset="0"/>
+            </a:endParaRPr>
+          </a:p>
+          <a:p>
+            <a:pPr marL="0" marR="0" indent="-914400">
+              <a:lnSpc>
+                <a:spcPct val="107000"/>
+              </a:lnSpc>
+              <a:spcAft>
+                <a:spcPts val="800"/>
+              </a:spcAft>
+              <a:buNone/>
+            </a:pPr>
+            <a:r>
+              <a:rPr lang="en-US" sz="1800" kern="100" dirty="0" err="1">
+                <a:effectLst/>
+                <a:latin typeface="Aptos" panose="020B0004020202020204" pitchFamily="34" charset="0"/>
+                <a:ea typeface="Aptos" panose="020B0004020202020204" pitchFamily="34" charset="0"/>
+                <a:cs typeface="Times New Roman" panose="02020603050405020304" pitchFamily="18" charset="0"/>
+              </a:rPr>
+              <a:t>Sparx</a:t>
+            </a:r>
+            <a:r>
+              <a:rPr lang="en-US" sz="1800" kern="100" dirty="0">
+                <a:effectLst/>
+                <a:latin typeface="Aptos" panose="020B0004020202020204" pitchFamily="34" charset="0"/>
+                <a:ea typeface="Aptos" panose="020B0004020202020204" pitchFamily="34" charset="0"/>
+                <a:cs typeface="Times New Roman" panose="02020603050405020304" pitchFamily="18" charset="0"/>
+              </a:rPr>
+              <a:t> Systems. (n.d.). </a:t>
+            </a:r>
+            <a:r>
+              <a:rPr lang="en-US" sz="1800" i="1" kern="100" dirty="0">
+                <a:effectLst/>
+                <a:latin typeface="Aptos" panose="020B0004020202020204" pitchFamily="34" charset="0"/>
+                <a:ea typeface="Aptos" panose="020B0004020202020204" pitchFamily="34" charset="0"/>
+                <a:cs typeface="Times New Roman" panose="02020603050405020304" pitchFamily="18" charset="0"/>
+              </a:rPr>
+              <a:t>Levels and types of requirements</a:t>
+            </a:r>
+            <a:r>
+              <a:rPr lang="en-US" sz="1800" kern="100" dirty="0">
+                <a:effectLst/>
+                <a:latin typeface="Aptos" panose="020B0004020202020204" pitchFamily="34" charset="0"/>
+                <a:ea typeface="Aptos" panose="020B0004020202020204" pitchFamily="34" charset="0"/>
+                <a:cs typeface="Times New Roman" panose="02020603050405020304" pitchFamily="18" charset="0"/>
+              </a:rPr>
+              <a:t>. Retrieved November 17, 2024, from 	</a:t>
+            </a:r>
+            <a:r>
+              <a:rPr lang="en-US" sz="1800" u="sng" kern="100" dirty="0">
+                <a:solidFill>
+                  <a:srgbClr val="467886"/>
+                </a:solidFill>
+                <a:effectLst/>
+                <a:latin typeface="Aptos" panose="020B0004020202020204" pitchFamily="34" charset="0"/>
+                <a:ea typeface="Aptos" panose="020B0004020202020204" pitchFamily="34" charset="0"/>
+                <a:cs typeface="Times New Roman" panose="02020603050405020304" pitchFamily="18" charset="0"/>
+                <a:hlinkClick r:id="rId7"/>
+              </a:rPr>
+              <a:t>https://sparxsystems.com/enterprise_architect_user_guide/17.0/modeling_domains/levels_and_types_of_requirements.html</a:t>
+            </a:r>
+            <a:endParaRPr lang="en-US" sz="1800" kern="100" dirty="0">
+              <a:effectLst/>
+              <a:latin typeface="Aptos" panose="020B0004020202020204" pitchFamily="34" charset="0"/>
+              <a:ea typeface="Aptos" panose="020B0004020202020204" pitchFamily="34" charset="0"/>
+              <a:cs typeface="Times New Roman" panose="02020603050405020304" pitchFamily="18" charset="0"/>
+            </a:endParaRPr>
+          </a:p>
+          <a:p>
+            <a:pPr marL="0" marR="0" indent="-914400">
+              <a:lnSpc>
+                <a:spcPct val="107000"/>
+              </a:lnSpc>
+              <a:spcAft>
+                <a:spcPts val="800"/>
+              </a:spcAft>
+              <a:buNone/>
+            </a:pPr>
+            <a:r>
+              <a:rPr lang="en-US" sz="1800" kern="100" dirty="0">
+                <a:effectLst/>
+                <a:latin typeface="Aptos" panose="020B0004020202020204" pitchFamily="34" charset="0"/>
+                <a:ea typeface="Aptos" panose="020B0004020202020204" pitchFamily="34" charset="0"/>
+                <a:cs typeface="Times New Roman" panose="02020603050405020304" pitchFamily="18" charset="0"/>
+              </a:rPr>
+              <a:t>U.S. Department of State. (n.d.). </a:t>
+            </a:r>
+            <a:r>
+              <a:rPr lang="en-US" sz="1800" i="1" kern="100" dirty="0">
+                <a:effectLst/>
+                <a:latin typeface="Aptos" panose="020B0004020202020204" pitchFamily="34" charset="0"/>
+                <a:ea typeface="Aptos" panose="020B0004020202020204" pitchFamily="34" charset="0"/>
+                <a:cs typeface="Times New Roman" panose="02020603050405020304" pitchFamily="18" charset="0"/>
+              </a:rPr>
+              <a:t>International traffic in arms regulations (ITAR)</a:t>
+            </a:r>
+            <a:r>
+              <a:rPr lang="en-US" sz="1800" kern="100" dirty="0">
+                <a:effectLst/>
+                <a:latin typeface="Aptos" panose="020B0004020202020204" pitchFamily="34" charset="0"/>
+                <a:ea typeface="Aptos" panose="020B0004020202020204" pitchFamily="34" charset="0"/>
+                <a:cs typeface="Times New Roman" panose="02020603050405020304" pitchFamily="18" charset="0"/>
+              </a:rPr>
+              <a:t>. Retrieved November 17, 2024, from 	</a:t>
+            </a:r>
+            <a:r>
+              <a:rPr lang="en-US" sz="1800" u="sng" kern="100" dirty="0">
+                <a:solidFill>
+                  <a:srgbClr val="467886"/>
+                </a:solidFill>
+                <a:effectLst/>
+                <a:latin typeface="Aptos" panose="020B0004020202020204" pitchFamily="34" charset="0"/>
+                <a:ea typeface="Aptos" panose="020B0004020202020204" pitchFamily="34" charset="0"/>
+                <a:cs typeface="Times New Roman" panose="02020603050405020304" pitchFamily="18" charset="0"/>
+                <a:hlinkClick r:id="rId8"/>
+              </a:rPr>
+              <a:t>https://www.pmddtc.state.gov/ddtc_public/ddtc_public?id=ddtc_kb_article_page&amp;sys_id=24d528fddbfc930044f9ff621f961987</a:t>
+            </a:r>
+            <a:endParaRPr lang="en-US" sz="1800" kern="100" dirty="0">
+              <a:effectLst/>
+              <a:latin typeface="Aptos" panose="020B0004020202020204" pitchFamily="34" charset="0"/>
+              <a:ea typeface="Aptos" panose="020B0004020202020204" pitchFamily="34" charset="0"/>
+              <a:cs typeface="Times New Roman" panose="02020603050405020304" pitchFamily="18" charset="0"/>
+            </a:endParaRPr>
+          </a:p>
+          <a:p>
+            <a:pPr marL="0" marR="0" indent="-914400">
+              <a:lnSpc>
+                <a:spcPct val="107000"/>
+              </a:lnSpc>
+              <a:spcAft>
+                <a:spcPts val="800"/>
+              </a:spcAft>
+              <a:buNone/>
+            </a:pPr>
+            <a:r>
+              <a:rPr lang="en-US" sz="1800" kern="100" dirty="0">
+                <a:effectLst/>
+                <a:latin typeface="Aptos" panose="020B0004020202020204" pitchFamily="34" charset="0"/>
+                <a:ea typeface="Aptos" panose="020B0004020202020204" pitchFamily="34" charset="0"/>
+                <a:cs typeface="Times New Roman" panose="02020603050405020304" pitchFamily="18" charset="0"/>
+              </a:rPr>
+              <a:t>Elastic. (n.d.). </a:t>
+            </a:r>
+            <a:r>
+              <a:rPr lang="en-US" sz="1800" i="1" kern="100" dirty="0">
+                <a:effectLst/>
+                <a:latin typeface="Aptos" panose="020B0004020202020204" pitchFamily="34" charset="0"/>
+                <a:ea typeface="Aptos" panose="020B0004020202020204" pitchFamily="34" charset="0"/>
+                <a:cs typeface="Times New Roman" panose="02020603050405020304" pitchFamily="18" charset="0"/>
+              </a:rPr>
+              <a:t>Elastic: Observability, security, and search</a:t>
+            </a:r>
+            <a:r>
+              <a:rPr lang="en-US" sz="1800" kern="100" dirty="0">
+                <a:effectLst/>
+                <a:latin typeface="Aptos" panose="020B0004020202020204" pitchFamily="34" charset="0"/>
+                <a:ea typeface="Aptos" panose="020B0004020202020204" pitchFamily="34" charset="0"/>
+                <a:cs typeface="Times New Roman" panose="02020603050405020304" pitchFamily="18" charset="0"/>
+              </a:rPr>
+              <a:t>. Retrieved November 18, 2024, from </a:t>
+            </a:r>
+            <a:r>
+              <a:rPr lang="en-US" sz="1800" u="sng" kern="100" dirty="0">
+                <a:solidFill>
+                  <a:srgbClr val="467886"/>
+                </a:solidFill>
+                <a:effectLst/>
+                <a:latin typeface="Aptos" panose="020B0004020202020204" pitchFamily="34" charset="0"/>
+                <a:ea typeface="Aptos" panose="020B0004020202020204" pitchFamily="34" charset="0"/>
+                <a:cs typeface="Times New Roman" panose="02020603050405020304" pitchFamily="18" charset="0"/>
+                <a:hlinkClick r:id="rId9"/>
+              </a:rPr>
+              <a:t>https://www.elastic.co/</a:t>
+            </a:r>
+            <a:endParaRPr lang="en-US" sz="1800" kern="100" dirty="0">
+              <a:effectLst/>
+              <a:latin typeface="Aptos" panose="020B0004020202020204" pitchFamily="34" charset="0"/>
+              <a:ea typeface="Aptos" panose="020B0004020202020204" pitchFamily="34" charset="0"/>
+              <a:cs typeface="Times New Roman" panose="02020603050405020304" pitchFamily="18" charset="0"/>
+            </a:endParaRPr>
+          </a:p>
+          <a:p>
+            <a:pPr marL="0" marR="0" indent="-914400">
+              <a:lnSpc>
+                <a:spcPct val="107000"/>
+              </a:lnSpc>
+              <a:spcAft>
+                <a:spcPts val="800"/>
+              </a:spcAft>
+              <a:buNone/>
+            </a:pPr>
+            <a:r>
+              <a:rPr lang="en-US" sz="1800" kern="100" dirty="0">
+                <a:effectLst/>
+                <a:latin typeface="Aptos" panose="020B0004020202020204" pitchFamily="34" charset="0"/>
+                <a:ea typeface="Aptos" panose="020B0004020202020204" pitchFamily="34" charset="0"/>
+                <a:cs typeface="Times New Roman" panose="02020603050405020304" pitchFamily="18" charset="0"/>
+              </a:rPr>
+              <a:t>Snowflake Inc. (n.d.). </a:t>
+            </a:r>
+            <a:r>
+              <a:rPr lang="en-US" sz="1800" i="1" kern="100" dirty="0">
+                <a:effectLst/>
+                <a:latin typeface="Aptos" panose="020B0004020202020204" pitchFamily="34" charset="0"/>
+                <a:ea typeface="Aptos" panose="020B0004020202020204" pitchFamily="34" charset="0"/>
+                <a:cs typeface="Times New Roman" panose="02020603050405020304" pitchFamily="18" charset="0"/>
+              </a:rPr>
+              <a:t>Snowflake: The data cloud</a:t>
+            </a:r>
+            <a:r>
+              <a:rPr lang="en-US" sz="1800" kern="100" dirty="0">
+                <a:effectLst/>
+                <a:latin typeface="Aptos" panose="020B0004020202020204" pitchFamily="34" charset="0"/>
+                <a:ea typeface="Aptos" panose="020B0004020202020204" pitchFamily="34" charset="0"/>
+                <a:cs typeface="Times New Roman" panose="02020603050405020304" pitchFamily="18" charset="0"/>
+              </a:rPr>
+              <a:t>. Retrieved November 18, 2024, from </a:t>
+            </a:r>
+            <a:r>
+              <a:rPr lang="en-US" sz="1800" u="sng" kern="100" dirty="0">
+                <a:solidFill>
+                  <a:srgbClr val="467886"/>
+                </a:solidFill>
+                <a:effectLst/>
+                <a:latin typeface="Aptos" panose="020B0004020202020204" pitchFamily="34" charset="0"/>
+                <a:ea typeface="Aptos" panose="020B0004020202020204" pitchFamily="34" charset="0"/>
+                <a:cs typeface="Times New Roman" panose="02020603050405020304" pitchFamily="18" charset="0"/>
+                <a:hlinkClick r:id="rId10"/>
+              </a:rPr>
+              <a:t>https://www.snowflake.com/en/</a:t>
+            </a:r>
+            <a:endParaRPr lang="en-US" sz="1800" kern="100" dirty="0">
+              <a:effectLst/>
+              <a:latin typeface="Aptos" panose="020B0004020202020204" pitchFamily="34" charset="0"/>
+              <a:ea typeface="Aptos" panose="020B0004020202020204" pitchFamily="34" charset="0"/>
+              <a:cs typeface="Times New Roman" panose="02020603050405020304" pitchFamily="18" charset="0"/>
+            </a:endParaRPr>
+          </a:p>
+          <a:p>
+            <a:pPr marL="0" marR="0" indent="-914400">
+              <a:lnSpc>
+                <a:spcPct val="107000"/>
+              </a:lnSpc>
+              <a:spcAft>
+                <a:spcPts val="800"/>
+              </a:spcAft>
+              <a:buNone/>
+            </a:pPr>
+            <a:r>
+              <a:rPr lang="en-US" sz="1800" kern="100" dirty="0">
+                <a:effectLst/>
+                <a:latin typeface="Aptos" panose="020B0004020202020204" pitchFamily="34" charset="0"/>
+                <a:ea typeface="Aptos" panose="020B0004020202020204" pitchFamily="34" charset="0"/>
+                <a:cs typeface="Times New Roman" panose="02020603050405020304" pitchFamily="18" charset="0"/>
+              </a:rPr>
+              <a:t>Extreme Programming. (n.d.). </a:t>
+            </a:r>
+            <a:r>
+              <a:rPr lang="en-US" sz="1800" i="1" kern="100" dirty="0">
+                <a:effectLst/>
+                <a:latin typeface="Aptos" panose="020B0004020202020204" pitchFamily="34" charset="0"/>
+                <a:ea typeface="Aptos" panose="020B0004020202020204" pitchFamily="34" charset="0"/>
+                <a:cs typeface="Times New Roman" panose="02020603050405020304" pitchFamily="18" charset="0"/>
+              </a:rPr>
+              <a:t>Agile Alliance</a:t>
+            </a:r>
+            <a:r>
+              <a:rPr lang="en-US" sz="1800" kern="100" dirty="0">
+                <a:effectLst/>
+                <a:latin typeface="Aptos" panose="020B0004020202020204" pitchFamily="34" charset="0"/>
+                <a:ea typeface="Aptos" panose="020B0004020202020204" pitchFamily="34" charset="0"/>
+                <a:cs typeface="Times New Roman" panose="02020603050405020304" pitchFamily="18" charset="0"/>
+              </a:rPr>
+              <a:t>. Retrieved November 27, 2024, from </a:t>
+            </a:r>
+            <a:r>
+              <a:rPr lang="en-US" sz="1800" u="sng" kern="100" dirty="0">
+                <a:solidFill>
+                  <a:srgbClr val="467886"/>
+                </a:solidFill>
+                <a:effectLst/>
+                <a:latin typeface="Aptos" panose="020B0004020202020204" pitchFamily="34" charset="0"/>
+                <a:ea typeface="Aptos" panose="020B0004020202020204" pitchFamily="34" charset="0"/>
+                <a:cs typeface="Times New Roman" panose="02020603050405020304" pitchFamily="18" charset="0"/>
+                <a:hlinkClick r:id="rId11"/>
+              </a:rPr>
+              <a:t>https://www.agilealliance.org/glossary/xp/</a:t>
+            </a:r>
+            <a:endParaRPr lang="en-US" sz="1800" kern="100" dirty="0">
+              <a:effectLst/>
+              <a:latin typeface="Aptos" panose="020B0004020202020204" pitchFamily="34" charset="0"/>
+              <a:ea typeface="Aptos" panose="020B0004020202020204" pitchFamily="34" charset="0"/>
+              <a:cs typeface="Times New Roman" panose="02020603050405020304" pitchFamily="18" charset="0"/>
+            </a:endParaRPr>
+          </a:p>
+          <a:p>
+            <a:pPr marL="0" indent="-914400">
+              <a:buNone/>
+            </a:pPr>
+            <a:endParaRPr lang="en-US" dirty="0"/>
           </a:p>
         </p:txBody>
       </p:sp>
     </p:spTree>
     <p:extLst>
       <p:ext uri="{BB962C8B-B14F-4D97-AF65-F5344CB8AC3E}">
-        <p14:creationId xmlns:p14="http://schemas.microsoft.com/office/powerpoint/2010/main" val="2110834798"/>
+        <p14:creationId xmlns:p14="http://schemas.microsoft.com/office/powerpoint/2010/main" val="859857448"/>
       </p:ext>
     </p:extLst>
   </p:cSld>
@@ -9454,7 +10480,7 @@
           <a:p>
             <a:r>
               <a:rPr lang="en-US" dirty="0"/>
-              <a:t>Problem Description/Research question</a:t>
+              <a:t>Problem Description</a:t>
             </a:r>
           </a:p>
         </p:txBody>
@@ -10818,14 +11844,49 @@
         <p:spPr>
           <a:xfrm>
             <a:off x="581193" y="2926052"/>
-            <a:ext cx="5699125" cy="2934999"/>
+            <a:ext cx="5699125" cy="3090284"/>
           </a:xfrm>
         </p:spPr>
         <p:txBody>
-          <a:bodyPr/>
+          <a:bodyPr>
+            <a:normAutofit fontScale="92500" lnSpcReduction="10000"/>
+          </a:bodyPr>
           <a:lstStyle/>
           <a:p>
-            <a:endParaRPr lang="en-US" dirty="0"/>
+            <a:r>
+              <a:rPr lang="en-US" dirty="0"/>
+              <a:t>Beats consume various data (files and metrics)</a:t>
+            </a:r>
+          </a:p>
+          <a:p>
+            <a:r>
+              <a:rPr lang="en-US" dirty="0"/>
+              <a:t>Application Performance Monitoring (APM) for software applications</a:t>
+            </a:r>
+          </a:p>
+          <a:p>
+            <a:r>
+              <a:rPr lang="en-US" dirty="0"/>
+              <a:t>Logstash aggregates beats data sinking into Elasticsearch</a:t>
+            </a:r>
+          </a:p>
+          <a:p>
+            <a:r>
+              <a:rPr lang="en-US" dirty="0"/>
+              <a:t>APM aggregates all application data sinking into Elasticsearch</a:t>
+            </a:r>
+          </a:p>
+          <a:p>
+            <a:r>
+              <a:rPr lang="en-US" dirty="0"/>
+              <a:t>Elasticsearch provides full text search capabilities through http and multiple clients</a:t>
+            </a:r>
+          </a:p>
+          <a:p>
+            <a:r>
+              <a:rPr lang="en-US" dirty="0"/>
+              <a:t>Kibana is a visualization tool that streams live data from Elasticsearch</a:t>
+            </a:r>
           </a:p>
         </p:txBody>
       </p:sp>

</xml_diff>